<commit_message>
ppt page some modify
</commit_message>
<xml_diff>
--- a/H20103 김본수 파이썬 개발결과보고서.pptx
+++ b/H20103 김본수 파이썬 개발결과보고서.pptx
@@ -33,28 +33,28 @@
   <p:notesSz cx="6858000" cy="9144000"/>
   <p:embeddedFontLst>
     <p:embeddedFont>
+      <p:font typeface="Calibri" panose="020F0502020204030204" pitchFamily="34" charset="0"/>
+      <p:regular r:id="rId25"/>
+      <p:bold r:id="rId26"/>
+      <p:italic r:id="rId27"/>
+      <p:boldItalic r:id="rId28"/>
+    </p:embeddedFont>
+    <p:embeddedFont>
+      <p:font typeface="Calibri Light" panose="020F0302020204030204" pitchFamily="34" charset="0"/>
+      <p:regular r:id="rId29"/>
+      <p:italic r:id="rId30"/>
+    </p:embeddedFont>
+    <p:embeddedFont>
       <p:font typeface="마루 부리 굵은" panose="020B0600000101010101" pitchFamily="50" charset="-127"/>
-      <p:bold r:id="rId25"/>
+      <p:bold r:id="rId31"/>
     </p:embeddedFont>
     <p:embeddedFont>
       <p:font typeface="마루 부리 조금굵은" panose="020B0600000101010101" pitchFamily="50" charset="-127"/>
-      <p:bold r:id="rId26"/>
+      <p:bold r:id="rId32"/>
     </p:embeddedFont>
     <p:embeddedFont>
       <p:font typeface="마루 부리 중간" panose="020B0600000101010101" pitchFamily="50" charset="-127"/>
-      <p:regular r:id="rId27"/>
-    </p:embeddedFont>
-    <p:embeddedFont>
-      <p:font typeface="Calibri" panose="020F0502020204030204" pitchFamily="34" charset="0"/>
-      <p:regular r:id="rId28"/>
-      <p:bold r:id="rId29"/>
-      <p:italic r:id="rId30"/>
-      <p:boldItalic r:id="rId31"/>
-    </p:embeddedFont>
-    <p:embeddedFont>
-      <p:font typeface="Calibri Light" panose="020F0302020204030204" pitchFamily="34" charset="0"/>
-      <p:regular r:id="rId32"/>
-      <p:italic r:id="rId33"/>
+      <p:regular r:id="rId33"/>
     </p:embeddedFont>
   </p:embeddedFontLst>
   <p:defaultTextStyle>
@@ -12115,137 +12115,6 @@
           </a:extLst>
         </p:spPr>
       </p:pic>
-      <p:sp>
-        <p:nvSpPr>
-          <p:cNvPr id="15" name="TextBox 14">
-            <a:extLst>
-              <a:ext uri="{FF2B5EF4-FFF2-40B4-BE49-F238E27FC236}">
-                <a16:creationId xmlns:a16="http://schemas.microsoft.com/office/drawing/2014/main" id="{BC14A431-803E-4B89-84F8-42DDC9D896EC}"/>
-              </a:ext>
-            </a:extLst>
-          </p:cNvPr>
-          <p:cNvSpPr txBox="1"/>
-          <p:nvPr/>
-        </p:nvSpPr>
-        <p:spPr>
-          <a:xfrm>
-            <a:off x="5026752" y="799234"/>
-            <a:ext cx="2138495" cy="107722"/>
-          </a:xfrm>
-          <a:prstGeom prst="rect">
-            <a:avLst/>
-          </a:prstGeom>
-          <a:noFill/>
-        </p:spPr>
-        <p:txBody>
-          <a:bodyPr wrap="square" rtlCol="0">
-            <a:spAutoFit/>
-          </a:bodyPr>
-          <a:lstStyle/>
-          <a:p>
-            <a:pPr algn="dist"/>
-            <a:r>
-              <a:rPr lang="ko-KR" altLang="en-US" sz="100" dirty="0">
-                <a:latin typeface="마루 부리 조금굵은" panose="020B0600000101010101" pitchFamily="50" charset="-127"/>
-                <a:ea typeface="마루 부리 조금굵은" panose="020B0600000101010101" pitchFamily="50" charset="-127"/>
-              </a:rPr>
-              <a:t>개발 배경 </a:t>
-            </a:r>
-            <a:r>
-              <a:rPr lang="en-US" altLang="ko-KR" sz="100" dirty="0">
-                <a:latin typeface="마루 부리 조금굵은" panose="020B0600000101010101" pitchFamily="50" charset="-127"/>
-                <a:ea typeface="마루 부리 조금굵은" panose="020B0600000101010101" pitchFamily="50" charset="-127"/>
-              </a:rPr>
-              <a:t>| </a:t>
-            </a:r>
-            <a:r>
-              <a:rPr lang="ko-KR" altLang="en-US" sz="100" dirty="0">
-                <a:latin typeface="마루 부리 조금굵은" panose="020B0600000101010101" pitchFamily="50" charset="-127"/>
-                <a:ea typeface="마루 부리 조금굵은" panose="020B0600000101010101" pitchFamily="50" charset="-127"/>
-              </a:rPr>
-              <a:t>목적</a:t>
-            </a:r>
-          </a:p>
-        </p:txBody>
-      </p:sp>
-      <p:sp>
-        <p:nvSpPr>
-          <p:cNvPr id="16" name="TextBox 15">
-            <a:extLst>
-              <a:ext uri="{FF2B5EF4-FFF2-40B4-BE49-F238E27FC236}">
-                <a16:creationId xmlns:a16="http://schemas.microsoft.com/office/drawing/2014/main" id="{D8C864E8-56FA-4544-A11F-AA18476F7D57}"/>
-              </a:ext>
-            </a:extLst>
-          </p:cNvPr>
-          <p:cNvSpPr txBox="1"/>
-          <p:nvPr/>
-        </p:nvSpPr>
-        <p:spPr>
-          <a:xfrm>
-            <a:off x="5092038" y="906956"/>
-            <a:ext cx="2007924" cy="107722"/>
-          </a:xfrm>
-          <a:prstGeom prst="rect">
-            <a:avLst/>
-          </a:prstGeom>
-          <a:noFill/>
-        </p:spPr>
-        <p:txBody>
-          <a:bodyPr wrap="square" rtlCol="0">
-            <a:spAutoFit/>
-          </a:bodyPr>
-          <a:lstStyle/>
-          <a:p>
-            <a:pPr algn="dist"/>
-            <a:r>
-              <a:rPr lang="ko-KR" altLang="en-US" sz="100" dirty="0">
-                <a:latin typeface="마루 부리 조금굵은" panose="020B0600000101010101" pitchFamily="50" charset="-127"/>
-                <a:ea typeface="마루 부리 조금굵은" panose="020B0600000101010101" pitchFamily="50" charset="-127"/>
-              </a:rPr>
-              <a:t>개발 계획</a:t>
-            </a:r>
-          </a:p>
-        </p:txBody>
-      </p:sp>
-      <p:sp>
-        <p:nvSpPr>
-          <p:cNvPr id="17" name="TextBox 16">
-            <a:extLst>
-              <a:ext uri="{FF2B5EF4-FFF2-40B4-BE49-F238E27FC236}">
-                <a16:creationId xmlns:a16="http://schemas.microsoft.com/office/drawing/2014/main" id="{5C039BE1-A32F-4BF1-9FC1-9847B0C9D0C4}"/>
-              </a:ext>
-            </a:extLst>
-          </p:cNvPr>
-          <p:cNvSpPr txBox="1"/>
-          <p:nvPr/>
-        </p:nvSpPr>
-        <p:spPr>
-          <a:xfrm>
-            <a:off x="5026752" y="1122400"/>
-            <a:ext cx="2138495" cy="107722"/>
-          </a:xfrm>
-          <a:prstGeom prst="rect">
-            <a:avLst/>
-          </a:prstGeom>
-          <a:noFill/>
-        </p:spPr>
-        <p:txBody>
-          <a:bodyPr wrap="square" rtlCol="0">
-            <a:spAutoFit/>
-          </a:bodyPr>
-          <a:lstStyle/>
-          <a:p>
-            <a:pPr algn="dist"/>
-            <a:r>
-              <a:rPr lang="ko-KR" altLang="en-US" sz="100" dirty="0">
-                <a:latin typeface="마루 부리 조금굵은" panose="020B0600000101010101" pitchFamily="50" charset="-127"/>
-                <a:ea typeface="마루 부리 조금굵은" panose="020B0600000101010101" pitchFamily="50" charset="-127"/>
-              </a:rPr>
-              <a:t>기대 및 효과</a:t>
-            </a:r>
-          </a:p>
-        </p:txBody>
-      </p:sp>
       <p:grpSp>
         <p:nvGrpSpPr>
           <p:cNvPr id="8" name="그룹 7">

</xml_diff>